<commit_message>
Creative Commons Attribution-Noncommercial-Share Alike 3.0 Germany License
git-svn-id: https://max-server.myftp.org/svn/pm/PM/trunk@108 bc5761fc-637f-c64d-944f-746135a3b5b4
</commit_message>
<xml_diff>
--- a/presentations/Patterns and Best Practices for dynamic OSGi Applications.pptx
+++ b/presentations/Patterns and Best Practices for dynamic OSGi Applications.pptx
@@ -2511,7 +2511,15 @@
             </a:r>
             <a:r>
               <a:rPr lang="en-US" sz="800" dirty="0" smtClean="0"/>
-              <a:t>Licensed under Creative Commons Attribution-Noncommercial-Share Alike 2.0 Germany License</a:t>
+              <a:t>Licensed under Creative Commons Attribution-Noncommercial-Share Alike </a:t>
+            </a:r>
+            <a:r>
+              <a:rPr lang="en-US" sz="800" dirty="0" smtClean="0"/>
+              <a:t>3.0 </a:t>
+            </a:r>
+            <a:r>
+              <a:rPr lang="en-US" sz="800" dirty="0" smtClean="0"/>
+              <a:t>Germany License</a:t>
             </a:r>
           </a:p>
         </p:txBody>
@@ -2877,22 +2885,21 @@
               </a:spcBef>
             </a:pPr>
             <a:r>
+              <a:rPr lang="en-US" sz="1800" noProof="0" dirty="0" smtClean="0">
+                <a:solidFill>
+                  <a:schemeClr val="tx1"/>
+                </a:solidFill>
+              </a:rPr>
+              <a:t>Kai Tödter</a:t>
+            </a:r>
+            <a:r>
               <a:rPr lang="en-US" sz="1800" noProof="0" dirty="0" smtClean="0"/>
-              <a:t>Kai </a:t>
-            </a:r>
-            <a:r>
-              <a:rPr lang="en-US" sz="1800" noProof="0" dirty="0" smtClean="0"/>
-              <a:t>Tödter, </a:t>
+              <a:t>, </a:t>
             </a:r>
             <a:r>
               <a:rPr lang="en-US" sz="1800" dirty="0" smtClean="0"/>
-              <a:t>Siemens </a:t>
-            </a:r>
-            <a:r>
-              <a:rPr lang="en-US" sz="1800" dirty="0" smtClean="0"/>
-              <a:t>Corporate Technology</a:t>
-            </a:r>
-            <a:endParaRPr lang="en-US" sz="1800" dirty="0" smtClean="0"/>
+              <a:t>Siemens Corporate Technology</a:t>
+            </a:r>
           </a:p>
           <a:p>
             <a:pPr marL="180000">
@@ -2901,7 +2908,11 @@
               </a:spcBef>
             </a:pPr>
             <a:r>
-              <a:rPr lang="en-US" sz="1800" noProof="0" dirty="0" smtClean="0"/>
+              <a:rPr lang="en-US" sz="1800" noProof="0" dirty="0" smtClean="0">
+                <a:solidFill>
+                  <a:schemeClr val="tx1"/>
+                </a:solidFill>
+              </a:rPr>
               <a:t>Gerd Wütherich</a:t>
             </a:r>
           </a:p>
@@ -2913,15 +2924,18 @@
             </a:pPr>
             <a:r>
               <a:rPr lang="en-US" sz="1800" dirty="0" smtClean="0">
+                <a:solidFill>
+                  <a:schemeClr val="tx1"/>
+                </a:solidFill>
                 <a:sym typeface="Wingdings"/>
               </a:rPr>
-              <a:t>Martin </a:t>
+              <a:t>Martin Lippert</a:t>
             </a:r>
             <a:r>
               <a:rPr lang="en-US" sz="1800" dirty="0" smtClean="0">
                 <a:sym typeface="Wingdings"/>
               </a:rPr>
-              <a:t>Lippert, </a:t>
+              <a:t>, </a:t>
             </a:r>
             <a:r>
               <a:rPr lang="de-DE" sz="1800" dirty="0" err="1" smtClean="0">
@@ -9469,6 +9483,30 @@
               <a:rPr lang="en-US" noProof="0" dirty="0" smtClean="0"/>
               <a:t> is dynamic!</a:t>
             </a:r>
+          </a:p>
+        </p:txBody>
+      </p:sp>
+      <p:sp>
+        <p:nvSpPr>
+          <p:cNvPr id="4" name="Slide Number Placeholder 3"/>
+          <p:cNvSpPr>
+            <a:spLocks noGrp="1"/>
+          </p:cNvSpPr>
+          <p:nvPr>
+            <p:ph type="sldNum" sz="quarter" idx="4"/>
+          </p:nvPr>
+        </p:nvSpPr>
+        <p:spPr/>
+        <p:txBody>
+          <a:bodyPr/>
+          <a:lstStyle/>
+          <a:p>
+            <a:fld id="{6A8BD7CC-570D-43FA-A214-4BA0539F1D29}" type="slidenum">
+              <a:rPr lang="de-DE" smtClean="0"/>
+              <a:pPr/>
+              <a:t>4</a:t>
+            </a:fld>
+            <a:endParaRPr lang="de-DE" dirty="0"/>
           </a:p>
         </p:txBody>
       </p:sp>

</xml_diff>